<commit_message>
Consistency in publish/subscribe slides.
</commit_message>
<xml_diff>
--- a/Collaborative Android Apps.pptx
+++ b/Collaborative Android Apps.pptx
@@ -17,8 +17,8 @@
     <p:sldId id="260" r:id="rId8"/>
     <p:sldId id="265" r:id="rId9"/>
     <p:sldId id="261" r:id="rId10"/>
-    <p:sldId id="262" r:id="rId11"/>
-    <p:sldId id="266" r:id="rId12"/>
+    <p:sldId id="266" r:id="rId11"/>
+    <p:sldId id="275" r:id="rId12"/>
     <p:sldId id="263" r:id="rId13"/>
     <p:sldId id="268" r:id="rId14"/>
     <p:sldId id="270" r:id="rId15"/>
@@ -999,7 +999,7 @@
           <a:p>
             <a:fld id="{3343E811-A2FF-486D-AA84-CF63E0126C39}" type="datetimeFigureOut">
               <a:rPr lang="en-US" smtClean="0"/>
-              <a:t>8/18/2012</a:t>
+              <a:t>8/19/2012</a:t>
             </a:fld>
             <a:endParaRPr lang="en-US"/>
           </a:p>
@@ -1212,7 +1212,7 @@
           <a:p>
             <a:fld id="{3343E811-A2FF-486D-AA84-CF63E0126C39}" type="datetimeFigureOut">
               <a:rPr lang="en-US" smtClean="0"/>
-              <a:t>8/18/2012</a:t>
+              <a:t>8/19/2012</a:t>
             </a:fld>
             <a:endParaRPr lang="en-US"/>
           </a:p>
@@ -1479,7 +1479,7 @@
           <a:p>
             <a:fld id="{3343E811-A2FF-486D-AA84-CF63E0126C39}" type="datetimeFigureOut">
               <a:rPr lang="en-US" smtClean="0"/>
-              <a:t>8/18/2012</a:t>
+              <a:t>8/19/2012</a:t>
             </a:fld>
             <a:endParaRPr lang="en-US"/>
           </a:p>
@@ -1629,7 +1629,7 @@
           <a:p>
             <a:fld id="{3343E811-A2FF-486D-AA84-CF63E0126C39}" type="datetimeFigureOut">
               <a:rPr lang="en-US" smtClean="0"/>
-              <a:t>8/18/2012</a:t>
+              <a:t>8/19/2012</a:t>
             </a:fld>
             <a:endParaRPr lang="en-US"/>
           </a:p>
@@ -1959,7 +1959,7 @@
           <a:p>
             <a:fld id="{3343E811-A2FF-486D-AA84-CF63E0126C39}" type="datetimeFigureOut">
               <a:rPr lang="en-US" smtClean="0"/>
-              <a:t>8/18/2012</a:t>
+              <a:t>8/19/2012</a:t>
             </a:fld>
             <a:endParaRPr lang="en-US"/>
           </a:p>
@@ -2267,7 +2267,7 @@
           <a:p>
             <a:fld id="{3343E811-A2FF-486D-AA84-CF63E0126C39}" type="datetimeFigureOut">
               <a:rPr lang="en-US" smtClean="0"/>
-              <a:t>8/18/2012</a:t>
+              <a:t>8/19/2012</a:t>
             </a:fld>
             <a:endParaRPr lang="en-US"/>
           </a:p>
@@ -2688,7 +2688,7 @@
           <a:p>
             <a:fld id="{3343E811-A2FF-486D-AA84-CF63E0126C39}" type="datetimeFigureOut">
               <a:rPr lang="en-US" smtClean="0"/>
-              <a:t>8/18/2012</a:t>
+              <a:t>8/19/2012</a:t>
             </a:fld>
             <a:endParaRPr lang="en-US"/>
           </a:p>
@@ -2801,7 +2801,7 @@
           <a:p>
             <a:fld id="{3343E811-A2FF-486D-AA84-CF63E0126C39}" type="datetimeFigureOut">
               <a:rPr lang="en-US" smtClean="0"/>
-              <a:t>8/18/2012</a:t>
+              <a:t>8/19/2012</a:t>
             </a:fld>
             <a:endParaRPr lang="en-US"/>
           </a:p>
@@ -2960,7 +2960,7 @@
           <a:p>
             <a:fld id="{3343E811-A2FF-486D-AA84-CF63E0126C39}" type="datetimeFigureOut">
               <a:rPr lang="en-US" smtClean="0"/>
-              <a:t>8/18/2012</a:t>
+              <a:t>8/19/2012</a:t>
             </a:fld>
             <a:endParaRPr lang="en-US"/>
           </a:p>
@@ -3344,7 +3344,7 @@
           <a:p>
             <a:fld id="{3343E811-A2FF-486D-AA84-CF63E0126C39}" type="datetimeFigureOut">
               <a:rPr lang="en-US" smtClean="0"/>
-              <a:t>8/18/2012</a:t>
+              <a:t>8/19/2012</a:t>
             </a:fld>
             <a:endParaRPr lang="en-US"/>
           </a:p>
@@ -3706,7 +3706,7 @@
           <a:p>
             <a:fld id="{3343E811-A2FF-486D-AA84-CF63E0126C39}" type="datetimeFigureOut">
               <a:rPr lang="en-US" smtClean="0"/>
-              <a:t>8/18/2012</a:t>
+              <a:t>8/19/2012</a:t>
             </a:fld>
             <a:endParaRPr lang="en-US"/>
           </a:p>
@@ -4040,7 +4040,7 @@
           <a:p>
             <a:fld id="{3343E811-A2FF-486D-AA84-CF63E0126C39}" type="datetimeFigureOut">
               <a:rPr lang="en-US" smtClean="0"/>
-              <a:t>8/18/2012</a:t>
+              <a:t>8/19/2012</a:t>
             </a:fld>
             <a:endParaRPr lang="en-US"/>
           </a:p>
@@ -4758,11 +4758,11 @@
   <p:clrMapOvr>
     <a:masterClrMapping/>
   </p:clrMapOvr>
-  <mc:AlternateContent xmlns:mc="http://schemas.openxmlformats.org/markup-compatibility/2006">
-    <mc:Choice xmlns:p14="http://schemas.microsoft.com/office/powerpoint/2010/main" Requires="p14">
+  <mc:AlternateContent xmlns:mc="http://schemas.openxmlformats.org/markup-compatibility/2006" xmlns:p14="http://schemas.microsoft.com/office/powerpoint/2010/main">
+    <mc:Choice Requires="p14">
       <p:transition spd="slow" p14:dur="2000"/>
     </mc:Choice>
-    <mc:Fallback>
+    <mc:Fallback xmlns="">
       <p:transition spd="slow"/>
     </mc:Fallback>
   </mc:AlternateContent>
@@ -4818,390 +4818,13 @@
       </p:sp>
       <p:sp>
         <p:nvSpPr>
-          <p:cNvPr id="4" name="Content Placeholder 2"/>
-          <p:cNvSpPr txBox="1">
-            <a:spLocks/>
-          </p:cNvSpPr>
-          <p:nvPr/>
-        </p:nvSpPr>
-        <p:spPr>
-          <a:xfrm>
-            <a:off x="4724400" y="1676400"/>
-            <a:ext cx="4191000" cy="4572000"/>
-          </a:xfrm>
-          <a:prstGeom prst="rect">
-            <a:avLst/>
-          </a:prstGeom>
-        </p:spPr>
-        <p:txBody>
-          <a:bodyPr vert="horz" lIns="91440" tIns="45720" rIns="91440" bIns="45720" rtlCol="0">
-            <a:noAutofit/>
-          </a:bodyPr>
-          <a:lstStyle>
-            <a:lvl1pPr marL="274320" indent="-228600" algn="l" defTabSz="914400" rtl="0" eaLnBrk="1" latinLnBrk="0" hangingPunct="1">
-              <a:spcBef>
-                <a:spcPct val="20000"/>
-              </a:spcBef>
-              <a:buClr>
-                <a:schemeClr val="accent1"/>
-              </a:buClr>
-              <a:buFont typeface="Wingdings 2" pitchFamily="18" charset="2"/>
-              <a:buChar char=""/>
-              <a:defRPr sz="2000" kern="1200" spc="150" baseline="0">
-                <a:solidFill>
-                  <a:schemeClr val="tx2"/>
-                </a:solidFill>
-                <a:latin typeface="+mn-lt"/>
-                <a:ea typeface="+mn-ea"/>
-                <a:cs typeface="+mn-cs"/>
-              </a:defRPr>
-            </a:lvl1pPr>
-            <a:lvl2pPr marL="548640" indent="-182880" algn="l" defTabSz="914400" rtl="0" eaLnBrk="1" latinLnBrk="0" hangingPunct="1">
-              <a:spcBef>
-                <a:spcPct val="20000"/>
-              </a:spcBef>
-              <a:buClr>
-                <a:schemeClr val="accent2"/>
-              </a:buClr>
-              <a:buFont typeface="Wingdings" pitchFamily="2" charset="2"/>
-              <a:buChar char="§"/>
-              <a:defRPr sz="1800" kern="1200" spc="100" baseline="0">
-                <a:solidFill>
-                  <a:schemeClr val="tx2"/>
-                </a:solidFill>
-                <a:latin typeface="+mn-lt"/>
-                <a:ea typeface="+mn-ea"/>
-                <a:cs typeface="+mn-cs"/>
-              </a:defRPr>
-            </a:lvl2pPr>
-            <a:lvl3pPr marL="822960" indent="-182880" algn="l" defTabSz="914400" rtl="0" eaLnBrk="1" latinLnBrk="0" hangingPunct="1">
-              <a:spcBef>
-                <a:spcPct val="20000"/>
-              </a:spcBef>
-              <a:buClr>
-                <a:schemeClr val="accent3"/>
-              </a:buClr>
-              <a:buFont typeface="Wingdings" pitchFamily="2" charset="2"/>
-              <a:buChar char="§"/>
-              <a:defRPr sz="1600" kern="1200" spc="100" baseline="0">
-                <a:solidFill>
-                  <a:schemeClr val="tx2"/>
-                </a:solidFill>
-                <a:latin typeface="+mn-lt"/>
-                <a:ea typeface="+mn-ea"/>
-                <a:cs typeface="+mn-cs"/>
-              </a:defRPr>
-            </a:lvl3pPr>
-            <a:lvl4pPr marL="1097280" indent="-182880" algn="l" defTabSz="914400" rtl="0" eaLnBrk="1" latinLnBrk="0" hangingPunct="1">
-              <a:spcBef>
-                <a:spcPct val="20000"/>
-              </a:spcBef>
-              <a:buClr>
-                <a:schemeClr val="accent4"/>
-              </a:buClr>
-              <a:buFont typeface="Wingdings" pitchFamily="2" charset="2"/>
-              <a:buChar char="§"/>
-              <a:defRPr sz="1400" kern="1200">
-                <a:solidFill>
-                  <a:schemeClr val="tx2"/>
-                </a:solidFill>
-                <a:latin typeface="+mn-lt"/>
-                <a:ea typeface="+mn-ea"/>
-                <a:cs typeface="+mn-cs"/>
-              </a:defRPr>
-            </a:lvl4pPr>
-            <a:lvl5pPr marL="1280160" indent="-182880" algn="l" defTabSz="914400" rtl="0" eaLnBrk="1" latinLnBrk="0" hangingPunct="1">
-              <a:spcBef>
-                <a:spcPct val="20000"/>
-              </a:spcBef>
-              <a:buClr>
-                <a:schemeClr val="accent6"/>
-              </a:buClr>
-              <a:buFont typeface="Wingdings" pitchFamily="2" charset="2"/>
-              <a:buChar char="§"/>
-              <a:defRPr sz="1300" kern="1200" spc="100" baseline="0">
-                <a:solidFill>
-                  <a:schemeClr val="tx2"/>
-                </a:solidFill>
-                <a:latin typeface="+mn-lt"/>
-                <a:ea typeface="+mn-ea"/>
-                <a:cs typeface="+mn-cs"/>
-              </a:defRPr>
-            </a:lvl5pPr>
-            <a:lvl6pPr marL="1554480" indent="-182880" algn="l" defTabSz="914400" rtl="0" eaLnBrk="1" latinLnBrk="0" hangingPunct="1">
-              <a:spcBef>
-                <a:spcPct val="20000"/>
-              </a:spcBef>
-              <a:buClr>
-                <a:schemeClr val="accent1"/>
-              </a:buClr>
-              <a:buFont typeface="Wingdings" pitchFamily="2" charset="2"/>
-              <a:buChar char="§"/>
-              <a:defRPr sz="1200" kern="1200">
-                <a:solidFill>
-                  <a:schemeClr val="tx2"/>
-                </a:solidFill>
-                <a:latin typeface="+mn-lt"/>
-                <a:ea typeface="+mn-ea"/>
-                <a:cs typeface="+mn-cs"/>
-              </a:defRPr>
-            </a:lvl6pPr>
-            <a:lvl7pPr marL="1828800" indent="-182880" algn="l" defTabSz="914400" rtl="0" eaLnBrk="1" latinLnBrk="0" hangingPunct="1">
-              <a:spcBef>
-                <a:spcPct val="20000"/>
-              </a:spcBef>
-              <a:buClr>
-                <a:schemeClr val="accent2"/>
-              </a:buClr>
-              <a:buFont typeface="Wingdings" pitchFamily="2" charset="2"/>
-              <a:buChar char="§"/>
-              <a:defRPr sz="1200" kern="1200">
-                <a:solidFill>
-                  <a:schemeClr val="tx2"/>
-                </a:solidFill>
-                <a:latin typeface="+mn-lt"/>
-                <a:ea typeface="+mn-ea"/>
-                <a:cs typeface="+mn-cs"/>
-              </a:defRPr>
-            </a:lvl7pPr>
-            <a:lvl8pPr marL="2103120" indent="-182880" algn="l" defTabSz="914400" rtl="0" eaLnBrk="1" latinLnBrk="0" hangingPunct="1">
-              <a:spcBef>
-                <a:spcPct val="20000"/>
-              </a:spcBef>
-              <a:buClr>
-                <a:schemeClr val="accent3"/>
-              </a:buClr>
-              <a:buFont typeface="Wingdings" pitchFamily="2" charset="2"/>
-              <a:buChar char="§"/>
-              <a:defRPr sz="1200" kern="1200">
-                <a:solidFill>
-                  <a:schemeClr val="tx2"/>
-                </a:solidFill>
-                <a:latin typeface="+mn-lt"/>
-                <a:ea typeface="+mn-ea"/>
-                <a:cs typeface="+mn-cs"/>
-              </a:defRPr>
-            </a:lvl8pPr>
-            <a:lvl9pPr marL="2377440" indent="-182880" algn="l" defTabSz="914400" rtl="0" eaLnBrk="1" latinLnBrk="0" hangingPunct="1">
-              <a:spcBef>
-                <a:spcPct val="20000"/>
-              </a:spcBef>
-              <a:buClr>
-                <a:schemeClr val="accent5"/>
-              </a:buClr>
-              <a:buFont typeface="Wingdings" pitchFamily="2" charset="2"/>
-              <a:buChar char="§"/>
-              <a:defRPr sz="1200" kern="1200">
-                <a:solidFill>
-                  <a:schemeClr val="tx2"/>
-                </a:solidFill>
-                <a:latin typeface="+mn-lt"/>
-                <a:ea typeface="+mn-ea"/>
-                <a:cs typeface="+mn-cs"/>
-              </a:defRPr>
-            </a:lvl9pPr>
-          </a:lstStyle>
-          <a:p>
-            <a:pPr marL="45720" indent="0">
-              <a:buNone/>
-            </a:pPr>
-            <a:r>
-              <a:rPr lang="en-US" sz="1800" dirty="0" smtClean="0"/>
-              <a:t>fact Share {</a:t>
-            </a:r>
-          </a:p>
-          <a:p>
-            <a:pPr marL="45720" indent="0">
-              <a:buNone/>
-            </a:pPr>
-            <a:r>
-              <a:rPr lang="en-US" sz="1800" dirty="0" smtClean="0"/>
-              <a:t>key:</a:t>
-            </a:r>
-          </a:p>
-          <a:p>
-            <a:pPr marL="45720" indent="0">
-              <a:buNone/>
-            </a:pPr>
-            <a:r>
-              <a:rPr lang="en-US" sz="1800" dirty="0"/>
-              <a:t> </a:t>
-            </a:r>
-            <a:r>
-              <a:rPr lang="en-US" sz="1800" dirty="0" smtClean="0"/>
-              <a:t>   unique;</a:t>
-            </a:r>
-          </a:p>
-          <a:p>
-            <a:pPr marL="45720" indent="0">
-              <a:buNone/>
-            </a:pPr>
-            <a:r>
-              <a:rPr lang="en-US" sz="1800" dirty="0"/>
-              <a:t> </a:t>
-            </a:r>
-            <a:r>
-              <a:rPr lang="en-US" sz="1800" dirty="0" smtClean="0"/>
-              <a:t>   </a:t>
-            </a:r>
-            <a:r>
-              <a:rPr lang="en-US" sz="1800" dirty="0" smtClean="0">
-                <a:solidFill>
-                  <a:schemeClr val="accent3"/>
-                </a:solidFill>
-              </a:rPr>
-              <a:t>publish</a:t>
-            </a:r>
-            <a:r>
-              <a:rPr lang="en-US" sz="1800" dirty="0" smtClean="0"/>
-              <a:t> Individual individual;</a:t>
-            </a:r>
-          </a:p>
-          <a:p>
-            <a:pPr marL="45720" indent="0">
-              <a:buNone/>
-            </a:pPr>
-            <a:r>
-              <a:rPr lang="en-US" sz="1800" dirty="0" smtClean="0"/>
-              <a:t>    List </a:t>
-            </a:r>
-            <a:r>
-              <a:rPr lang="en-US" sz="1800" dirty="0" err="1" smtClean="0"/>
-              <a:t>list</a:t>
-            </a:r>
-            <a:r>
-              <a:rPr lang="en-US" sz="1800" dirty="0" smtClean="0"/>
-              <a:t>;</a:t>
-            </a:r>
-          </a:p>
-          <a:p>
-            <a:pPr marL="45720" indent="0">
-              <a:buNone/>
-            </a:pPr>
-            <a:r>
-              <a:rPr lang="en-US" sz="1800" dirty="0"/>
-              <a:t>}</a:t>
-            </a:r>
-            <a:endParaRPr lang="en-US" sz="1800" dirty="0" smtClean="0"/>
-          </a:p>
-          <a:p>
-            <a:pPr marL="45720" indent="0">
-              <a:buNone/>
-            </a:pPr>
-            <a:endParaRPr lang="en-US" sz="1800" dirty="0"/>
-          </a:p>
-          <a:p>
-            <a:pPr marL="45720" indent="0">
-              <a:buNone/>
-            </a:pPr>
-            <a:r>
-              <a:rPr lang="en-US" sz="1800" dirty="0" smtClean="0"/>
-              <a:t>fact </a:t>
-            </a:r>
-            <a:r>
-              <a:rPr lang="en-US" sz="1800" dirty="0"/>
-              <a:t>Task {</a:t>
-            </a:r>
-          </a:p>
-          <a:p>
-            <a:pPr marL="45720" indent="0">
-              <a:buNone/>
-            </a:pPr>
-            <a:r>
-              <a:rPr lang="en-US" sz="1800" dirty="0"/>
-              <a:t>key:</a:t>
-            </a:r>
-          </a:p>
-          <a:p>
-            <a:pPr marL="45720" indent="0">
-              <a:buNone/>
-            </a:pPr>
-            <a:r>
-              <a:rPr lang="en-US" sz="1800" dirty="0" smtClean="0"/>
-              <a:t>    </a:t>
-            </a:r>
-            <a:r>
-              <a:rPr lang="en-US" sz="1800" dirty="0"/>
-              <a:t>unique;</a:t>
-            </a:r>
-          </a:p>
-          <a:p>
-            <a:pPr marL="45720" indent="0">
-              <a:buNone/>
-            </a:pPr>
-            <a:r>
-              <a:rPr lang="en-US" sz="1800" dirty="0"/>
-              <a:t>    </a:t>
-            </a:r>
-            <a:r>
-              <a:rPr lang="en-US" sz="1800" dirty="0">
-                <a:solidFill>
-                  <a:schemeClr val="accent3"/>
-                </a:solidFill>
-              </a:rPr>
-              <a:t>publish</a:t>
-            </a:r>
-            <a:r>
-              <a:rPr lang="en-US" sz="1800" dirty="0"/>
-              <a:t> List </a:t>
-            </a:r>
-            <a:r>
-              <a:rPr lang="en-US" sz="1800" dirty="0" err="1"/>
-              <a:t>list</a:t>
-            </a:r>
-            <a:endParaRPr lang="en-US" sz="1800" dirty="0"/>
-          </a:p>
-          <a:p>
-            <a:pPr marL="45720" indent="0">
-              <a:buNone/>
-            </a:pPr>
-            <a:r>
-              <a:rPr lang="en-US" sz="1800" dirty="0"/>
-              <a:t>        where not </a:t>
-            </a:r>
-            <a:r>
-              <a:rPr lang="en-US" sz="1800" dirty="0" err="1"/>
-              <a:t>this.isComplete</a:t>
-            </a:r>
-            <a:r>
-              <a:rPr lang="en-US" sz="1800" dirty="0"/>
-              <a:t>;</a:t>
-            </a:r>
-          </a:p>
-          <a:p>
-            <a:pPr marL="45720" indent="0">
-              <a:buNone/>
-            </a:pPr>
-            <a:r>
-              <a:rPr lang="en-US" sz="1800" dirty="0"/>
-              <a:t>    time created</a:t>
-            </a:r>
-            <a:r>
-              <a:rPr lang="en-US" sz="1800" dirty="0" smtClean="0"/>
-              <a:t>;</a:t>
-            </a:r>
-          </a:p>
-          <a:p>
-            <a:pPr marL="45720" indent="0">
-              <a:buNone/>
-            </a:pPr>
-            <a:r>
-              <a:rPr lang="en-US" sz="1800" dirty="0" smtClean="0"/>
-              <a:t>}</a:t>
-            </a:r>
-            <a:endParaRPr lang="en-US" sz="1800" dirty="0"/>
-          </a:p>
-        </p:txBody>
-      </p:sp>
-      <p:sp>
-        <p:nvSpPr>
           <p:cNvPr id="5" name="Oval 4"/>
           <p:cNvSpPr/>
           <p:nvPr/>
         </p:nvSpPr>
         <p:spPr>
           <a:xfrm>
-            <a:off x="407640" y="2744813"/>
+            <a:off x="2465040" y="1832026"/>
             <a:ext cx="1676400" cy="533400"/>
           </a:xfrm>
           <a:prstGeom prst="ellipse">
@@ -5245,7 +4868,7 @@
         </p:nvSpPr>
         <p:spPr>
           <a:xfrm>
-            <a:off x="653143" y="4191000"/>
+            <a:off x="2710543" y="3278213"/>
             <a:ext cx="1676400" cy="533400"/>
           </a:xfrm>
           <a:prstGeom prst="ellipse">
@@ -5289,7 +4912,7 @@
         </p:nvSpPr>
         <p:spPr>
           <a:xfrm>
-            <a:off x="2329543" y="2744813"/>
+            <a:off x="4386943" y="1832026"/>
             <a:ext cx="1676400" cy="533400"/>
           </a:xfrm>
           <a:prstGeom prst="ellipse">
@@ -5333,7 +4956,7 @@
         </p:nvSpPr>
         <p:spPr>
           <a:xfrm>
-            <a:off x="2819400" y="4191000"/>
+            <a:off x="4876800" y="3278213"/>
             <a:ext cx="1676400" cy="533400"/>
           </a:xfrm>
           <a:prstGeom prst="ellipse">
@@ -5380,7 +5003,7 @@
         </p:nvCxnSpPr>
         <p:spPr>
           <a:xfrm flipH="1" flipV="1">
-            <a:off x="1245840" y="3278213"/>
+            <a:off x="3303240" y="2365426"/>
             <a:ext cx="245503" cy="912787"/>
           </a:xfrm>
           <a:prstGeom prst="straightConnector1">
@@ -5419,7 +5042,7 @@
         </p:nvCxnSpPr>
         <p:spPr>
           <a:xfrm flipV="1">
-            <a:off x="2084040" y="3200098"/>
+            <a:off x="4141440" y="2287311"/>
             <a:ext cx="491006" cy="1069017"/>
           </a:xfrm>
           <a:prstGeom prst="straightConnector1">
@@ -5455,7 +5078,7 @@
         </p:nvCxnSpPr>
         <p:spPr>
           <a:xfrm flipH="1" flipV="1">
-            <a:off x="3167743" y="3278213"/>
+            <a:off x="5225143" y="2365426"/>
             <a:ext cx="489857" cy="912787"/>
           </a:xfrm>
           <a:prstGeom prst="straightConnector1">
@@ -5483,21 +5106,579 @@
           </a:fontRef>
         </p:style>
       </p:cxnSp>
+      <p:sp>
+        <p:nvSpPr>
+          <p:cNvPr id="14" name="Content Placeholder 2"/>
+          <p:cNvSpPr txBox="1">
+            <a:spLocks/>
+          </p:cNvSpPr>
+          <p:nvPr/>
+        </p:nvSpPr>
+        <p:spPr>
+          <a:xfrm>
+            <a:off x="195943" y="3962400"/>
+            <a:ext cx="4191000" cy="2438400"/>
+          </a:xfrm>
+          <a:prstGeom prst="rect">
+            <a:avLst/>
+          </a:prstGeom>
+        </p:spPr>
+        <p:txBody>
+          <a:bodyPr vert="horz" lIns="91440" tIns="45720" rIns="91440" bIns="45720" rtlCol="0">
+            <a:noAutofit/>
+          </a:bodyPr>
+          <a:lstStyle>
+            <a:lvl1pPr marL="274320" indent="-228600" algn="l" defTabSz="914400" rtl="0" eaLnBrk="1" latinLnBrk="0" hangingPunct="1">
+              <a:spcBef>
+                <a:spcPct val="20000"/>
+              </a:spcBef>
+              <a:buClr>
+                <a:schemeClr val="accent1"/>
+              </a:buClr>
+              <a:buFont typeface="Wingdings 2" pitchFamily="18" charset="2"/>
+              <a:buChar char=""/>
+              <a:defRPr sz="2000" kern="1200" spc="150" baseline="0">
+                <a:solidFill>
+                  <a:schemeClr val="tx2"/>
+                </a:solidFill>
+                <a:latin typeface="+mn-lt"/>
+                <a:ea typeface="+mn-ea"/>
+                <a:cs typeface="+mn-cs"/>
+              </a:defRPr>
+            </a:lvl1pPr>
+            <a:lvl2pPr marL="548640" indent="-182880" algn="l" defTabSz="914400" rtl="0" eaLnBrk="1" latinLnBrk="0" hangingPunct="1">
+              <a:spcBef>
+                <a:spcPct val="20000"/>
+              </a:spcBef>
+              <a:buClr>
+                <a:schemeClr val="accent2"/>
+              </a:buClr>
+              <a:buFont typeface="Wingdings" pitchFamily="2" charset="2"/>
+              <a:buChar char="§"/>
+              <a:defRPr sz="1800" kern="1200" spc="100" baseline="0">
+                <a:solidFill>
+                  <a:schemeClr val="tx2"/>
+                </a:solidFill>
+                <a:latin typeface="+mn-lt"/>
+                <a:ea typeface="+mn-ea"/>
+                <a:cs typeface="+mn-cs"/>
+              </a:defRPr>
+            </a:lvl2pPr>
+            <a:lvl3pPr marL="822960" indent="-182880" algn="l" defTabSz="914400" rtl="0" eaLnBrk="1" latinLnBrk="0" hangingPunct="1">
+              <a:spcBef>
+                <a:spcPct val="20000"/>
+              </a:spcBef>
+              <a:buClr>
+                <a:schemeClr val="accent3"/>
+              </a:buClr>
+              <a:buFont typeface="Wingdings" pitchFamily="2" charset="2"/>
+              <a:buChar char="§"/>
+              <a:defRPr sz="1600" kern="1200" spc="100" baseline="0">
+                <a:solidFill>
+                  <a:schemeClr val="tx2"/>
+                </a:solidFill>
+                <a:latin typeface="+mn-lt"/>
+                <a:ea typeface="+mn-ea"/>
+                <a:cs typeface="+mn-cs"/>
+              </a:defRPr>
+            </a:lvl3pPr>
+            <a:lvl4pPr marL="1097280" indent="-182880" algn="l" defTabSz="914400" rtl="0" eaLnBrk="1" latinLnBrk="0" hangingPunct="1">
+              <a:spcBef>
+                <a:spcPct val="20000"/>
+              </a:spcBef>
+              <a:buClr>
+                <a:schemeClr val="accent4"/>
+              </a:buClr>
+              <a:buFont typeface="Wingdings" pitchFamily="2" charset="2"/>
+              <a:buChar char="§"/>
+              <a:defRPr sz="1400" kern="1200">
+                <a:solidFill>
+                  <a:schemeClr val="tx2"/>
+                </a:solidFill>
+                <a:latin typeface="+mn-lt"/>
+                <a:ea typeface="+mn-ea"/>
+                <a:cs typeface="+mn-cs"/>
+              </a:defRPr>
+            </a:lvl4pPr>
+            <a:lvl5pPr marL="1280160" indent="-182880" algn="l" defTabSz="914400" rtl="0" eaLnBrk="1" latinLnBrk="0" hangingPunct="1">
+              <a:spcBef>
+                <a:spcPct val="20000"/>
+              </a:spcBef>
+              <a:buClr>
+                <a:schemeClr val="accent6"/>
+              </a:buClr>
+              <a:buFont typeface="Wingdings" pitchFamily="2" charset="2"/>
+              <a:buChar char="§"/>
+              <a:defRPr sz="1300" kern="1200" spc="100" baseline="0">
+                <a:solidFill>
+                  <a:schemeClr val="tx2"/>
+                </a:solidFill>
+                <a:latin typeface="+mn-lt"/>
+                <a:ea typeface="+mn-ea"/>
+                <a:cs typeface="+mn-cs"/>
+              </a:defRPr>
+            </a:lvl5pPr>
+            <a:lvl6pPr marL="1554480" indent="-182880" algn="l" defTabSz="914400" rtl="0" eaLnBrk="1" latinLnBrk="0" hangingPunct="1">
+              <a:spcBef>
+                <a:spcPct val="20000"/>
+              </a:spcBef>
+              <a:buClr>
+                <a:schemeClr val="accent1"/>
+              </a:buClr>
+              <a:buFont typeface="Wingdings" pitchFamily="2" charset="2"/>
+              <a:buChar char="§"/>
+              <a:defRPr sz="1200" kern="1200">
+                <a:solidFill>
+                  <a:schemeClr val="tx2"/>
+                </a:solidFill>
+                <a:latin typeface="+mn-lt"/>
+                <a:ea typeface="+mn-ea"/>
+                <a:cs typeface="+mn-cs"/>
+              </a:defRPr>
+            </a:lvl6pPr>
+            <a:lvl7pPr marL="1828800" indent="-182880" algn="l" defTabSz="914400" rtl="0" eaLnBrk="1" latinLnBrk="0" hangingPunct="1">
+              <a:spcBef>
+                <a:spcPct val="20000"/>
+              </a:spcBef>
+              <a:buClr>
+                <a:schemeClr val="accent2"/>
+              </a:buClr>
+              <a:buFont typeface="Wingdings" pitchFamily="2" charset="2"/>
+              <a:buChar char="§"/>
+              <a:defRPr sz="1200" kern="1200">
+                <a:solidFill>
+                  <a:schemeClr val="tx2"/>
+                </a:solidFill>
+                <a:latin typeface="+mn-lt"/>
+                <a:ea typeface="+mn-ea"/>
+                <a:cs typeface="+mn-cs"/>
+              </a:defRPr>
+            </a:lvl7pPr>
+            <a:lvl8pPr marL="2103120" indent="-182880" algn="l" defTabSz="914400" rtl="0" eaLnBrk="1" latinLnBrk="0" hangingPunct="1">
+              <a:spcBef>
+                <a:spcPct val="20000"/>
+              </a:spcBef>
+              <a:buClr>
+                <a:schemeClr val="accent3"/>
+              </a:buClr>
+              <a:buFont typeface="Wingdings" pitchFamily="2" charset="2"/>
+              <a:buChar char="§"/>
+              <a:defRPr sz="1200" kern="1200">
+                <a:solidFill>
+                  <a:schemeClr val="tx2"/>
+                </a:solidFill>
+                <a:latin typeface="+mn-lt"/>
+                <a:ea typeface="+mn-ea"/>
+                <a:cs typeface="+mn-cs"/>
+              </a:defRPr>
+            </a:lvl8pPr>
+            <a:lvl9pPr marL="2377440" indent="-182880" algn="l" defTabSz="914400" rtl="0" eaLnBrk="1" latinLnBrk="0" hangingPunct="1">
+              <a:spcBef>
+                <a:spcPct val="20000"/>
+              </a:spcBef>
+              <a:buClr>
+                <a:schemeClr val="accent5"/>
+              </a:buClr>
+              <a:buFont typeface="Wingdings" pitchFamily="2" charset="2"/>
+              <a:buChar char="§"/>
+              <a:defRPr sz="1200" kern="1200">
+                <a:solidFill>
+                  <a:schemeClr val="tx2"/>
+                </a:solidFill>
+                <a:latin typeface="+mn-lt"/>
+                <a:ea typeface="+mn-ea"/>
+                <a:cs typeface="+mn-cs"/>
+              </a:defRPr>
+            </a:lvl9pPr>
+          </a:lstStyle>
+          <a:p>
+            <a:pPr marL="45720" indent="0">
+              <a:buNone/>
+            </a:pPr>
+            <a:r>
+              <a:rPr lang="en-US" sz="1800" dirty="0" smtClean="0"/>
+              <a:t>fact Share {</a:t>
+            </a:r>
+          </a:p>
+          <a:p>
+            <a:pPr marL="45720" indent="0">
+              <a:buNone/>
+            </a:pPr>
+            <a:r>
+              <a:rPr lang="en-US" sz="1800" dirty="0" smtClean="0"/>
+              <a:t>key:</a:t>
+            </a:r>
+          </a:p>
+          <a:p>
+            <a:pPr marL="45720" indent="0">
+              <a:buNone/>
+            </a:pPr>
+            <a:r>
+              <a:rPr lang="en-US" sz="1800" dirty="0"/>
+              <a:t> </a:t>
+            </a:r>
+            <a:r>
+              <a:rPr lang="en-US" sz="1800" dirty="0" smtClean="0"/>
+              <a:t>   unique;</a:t>
+            </a:r>
+          </a:p>
+          <a:p>
+            <a:pPr marL="45720" indent="0">
+              <a:buNone/>
+            </a:pPr>
+            <a:r>
+              <a:rPr lang="en-US" sz="1800" dirty="0"/>
+              <a:t> </a:t>
+            </a:r>
+            <a:r>
+              <a:rPr lang="en-US" sz="1800" dirty="0" smtClean="0"/>
+              <a:t>   </a:t>
+            </a:r>
+            <a:r>
+              <a:rPr lang="en-US" sz="1800" dirty="0" smtClean="0">
+                <a:solidFill>
+                  <a:schemeClr val="accent3"/>
+                </a:solidFill>
+              </a:rPr>
+              <a:t>publish</a:t>
+            </a:r>
+            <a:r>
+              <a:rPr lang="en-US" sz="1800" dirty="0" smtClean="0"/>
+              <a:t> Individual individual;</a:t>
+            </a:r>
+          </a:p>
+          <a:p>
+            <a:pPr marL="45720" indent="0">
+              <a:buNone/>
+            </a:pPr>
+            <a:r>
+              <a:rPr lang="en-US" sz="1800" dirty="0" smtClean="0"/>
+              <a:t>    List </a:t>
+            </a:r>
+            <a:r>
+              <a:rPr lang="en-US" sz="1800" dirty="0" err="1" smtClean="0"/>
+              <a:t>list</a:t>
+            </a:r>
+            <a:r>
+              <a:rPr lang="en-US" sz="1800" dirty="0" smtClean="0"/>
+              <a:t>;</a:t>
+            </a:r>
+          </a:p>
+          <a:p>
+            <a:pPr marL="45720" indent="0">
+              <a:buNone/>
+            </a:pPr>
+            <a:r>
+              <a:rPr lang="en-US" sz="1800" dirty="0" smtClean="0"/>
+              <a:t>}</a:t>
+            </a:r>
+            <a:endParaRPr lang="en-US" sz="1800" dirty="0" smtClean="0"/>
+          </a:p>
+        </p:txBody>
+      </p:sp>
+      <p:sp>
+        <p:nvSpPr>
+          <p:cNvPr id="15" name="Content Placeholder 2"/>
+          <p:cNvSpPr txBox="1">
+            <a:spLocks/>
+          </p:cNvSpPr>
+          <p:nvPr/>
+        </p:nvSpPr>
+        <p:spPr>
+          <a:xfrm>
+            <a:off x="4654218" y="3962400"/>
+            <a:ext cx="4191000" cy="2438400"/>
+          </a:xfrm>
+          <a:prstGeom prst="rect">
+            <a:avLst/>
+          </a:prstGeom>
+        </p:spPr>
+        <p:txBody>
+          <a:bodyPr vert="horz" lIns="91440" tIns="45720" rIns="91440" bIns="45720" rtlCol="0">
+            <a:noAutofit/>
+          </a:bodyPr>
+          <a:lstStyle>
+            <a:lvl1pPr marL="274320" indent="-228600" algn="l" defTabSz="914400" rtl="0" eaLnBrk="1" latinLnBrk="0" hangingPunct="1">
+              <a:spcBef>
+                <a:spcPct val="20000"/>
+              </a:spcBef>
+              <a:buClr>
+                <a:schemeClr val="accent1"/>
+              </a:buClr>
+              <a:buFont typeface="Wingdings 2" pitchFamily="18" charset="2"/>
+              <a:buChar char=""/>
+              <a:defRPr sz="2000" kern="1200" spc="150" baseline="0">
+                <a:solidFill>
+                  <a:schemeClr val="tx2"/>
+                </a:solidFill>
+                <a:latin typeface="+mn-lt"/>
+                <a:ea typeface="+mn-ea"/>
+                <a:cs typeface="+mn-cs"/>
+              </a:defRPr>
+            </a:lvl1pPr>
+            <a:lvl2pPr marL="548640" indent="-182880" algn="l" defTabSz="914400" rtl="0" eaLnBrk="1" latinLnBrk="0" hangingPunct="1">
+              <a:spcBef>
+                <a:spcPct val="20000"/>
+              </a:spcBef>
+              <a:buClr>
+                <a:schemeClr val="accent2"/>
+              </a:buClr>
+              <a:buFont typeface="Wingdings" pitchFamily="2" charset="2"/>
+              <a:buChar char="§"/>
+              <a:defRPr sz="1800" kern="1200" spc="100" baseline="0">
+                <a:solidFill>
+                  <a:schemeClr val="tx2"/>
+                </a:solidFill>
+                <a:latin typeface="+mn-lt"/>
+                <a:ea typeface="+mn-ea"/>
+                <a:cs typeface="+mn-cs"/>
+              </a:defRPr>
+            </a:lvl2pPr>
+            <a:lvl3pPr marL="822960" indent="-182880" algn="l" defTabSz="914400" rtl="0" eaLnBrk="1" latinLnBrk="0" hangingPunct="1">
+              <a:spcBef>
+                <a:spcPct val="20000"/>
+              </a:spcBef>
+              <a:buClr>
+                <a:schemeClr val="accent3"/>
+              </a:buClr>
+              <a:buFont typeface="Wingdings" pitchFamily="2" charset="2"/>
+              <a:buChar char="§"/>
+              <a:defRPr sz="1600" kern="1200" spc="100" baseline="0">
+                <a:solidFill>
+                  <a:schemeClr val="tx2"/>
+                </a:solidFill>
+                <a:latin typeface="+mn-lt"/>
+                <a:ea typeface="+mn-ea"/>
+                <a:cs typeface="+mn-cs"/>
+              </a:defRPr>
+            </a:lvl3pPr>
+            <a:lvl4pPr marL="1097280" indent="-182880" algn="l" defTabSz="914400" rtl="0" eaLnBrk="1" latinLnBrk="0" hangingPunct="1">
+              <a:spcBef>
+                <a:spcPct val="20000"/>
+              </a:spcBef>
+              <a:buClr>
+                <a:schemeClr val="accent4"/>
+              </a:buClr>
+              <a:buFont typeface="Wingdings" pitchFamily="2" charset="2"/>
+              <a:buChar char="§"/>
+              <a:defRPr sz="1400" kern="1200">
+                <a:solidFill>
+                  <a:schemeClr val="tx2"/>
+                </a:solidFill>
+                <a:latin typeface="+mn-lt"/>
+                <a:ea typeface="+mn-ea"/>
+                <a:cs typeface="+mn-cs"/>
+              </a:defRPr>
+            </a:lvl4pPr>
+            <a:lvl5pPr marL="1280160" indent="-182880" algn="l" defTabSz="914400" rtl="0" eaLnBrk="1" latinLnBrk="0" hangingPunct="1">
+              <a:spcBef>
+                <a:spcPct val="20000"/>
+              </a:spcBef>
+              <a:buClr>
+                <a:schemeClr val="accent6"/>
+              </a:buClr>
+              <a:buFont typeface="Wingdings" pitchFamily="2" charset="2"/>
+              <a:buChar char="§"/>
+              <a:defRPr sz="1300" kern="1200" spc="100" baseline="0">
+                <a:solidFill>
+                  <a:schemeClr val="tx2"/>
+                </a:solidFill>
+                <a:latin typeface="+mn-lt"/>
+                <a:ea typeface="+mn-ea"/>
+                <a:cs typeface="+mn-cs"/>
+              </a:defRPr>
+            </a:lvl5pPr>
+            <a:lvl6pPr marL="1554480" indent="-182880" algn="l" defTabSz="914400" rtl="0" eaLnBrk="1" latinLnBrk="0" hangingPunct="1">
+              <a:spcBef>
+                <a:spcPct val="20000"/>
+              </a:spcBef>
+              <a:buClr>
+                <a:schemeClr val="accent1"/>
+              </a:buClr>
+              <a:buFont typeface="Wingdings" pitchFamily="2" charset="2"/>
+              <a:buChar char="§"/>
+              <a:defRPr sz="1200" kern="1200">
+                <a:solidFill>
+                  <a:schemeClr val="tx2"/>
+                </a:solidFill>
+                <a:latin typeface="+mn-lt"/>
+                <a:ea typeface="+mn-ea"/>
+                <a:cs typeface="+mn-cs"/>
+              </a:defRPr>
+            </a:lvl6pPr>
+            <a:lvl7pPr marL="1828800" indent="-182880" algn="l" defTabSz="914400" rtl="0" eaLnBrk="1" latinLnBrk="0" hangingPunct="1">
+              <a:spcBef>
+                <a:spcPct val="20000"/>
+              </a:spcBef>
+              <a:buClr>
+                <a:schemeClr val="accent2"/>
+              </a:buClr>
+              <a:buFont typeface="Wingdings" pitchFamily="2" charset="2"/>
+              <a:buChar char="§"/>
+              <a:defRPr sz="1200" kern="1200">
+                <a:solidFill>
+                  <a:schemeClr val="tx2"/>
+                </a:solidFill>
+                <a:latin typeface="+mn-lt"/>
+                <a:ea typeface="+mn-ea"/>
+                <a:cs typeface="+mn-cs"/>
+              </a:defRPr>
+            </a:lvl7pPr>
+            <a:lvl8pPr marL="2103120" indent="-182880" algn="l" defTabSz="914400" rtl="0" eaLnBrk="1" latinLnBrk="0" hangingPunct="1">
+              <a:spcBef>
+                <a:spcPct val="20000"/>
+              </a:spcBef>
+              <a:buClr>
+                <a:schemeClr val="accent3"/>
+              </a:buClr>
+              <a:buFont typeface="Wingdings" pitchFamily="2" charset="2"/>
+              <a:buChar char="§"/>
+              <a:defRPr sz="1200" kern="1200">
+                <a:solidFill>
+                  <a:schemeClr val="tx2"/>
+                </a:solidFill>
+                <a:latin typeface="+mn-lt"/>
+                <a:ea typeface="+mn-ea"/>
+                <a:cs typeface="+mn-cs"/>
+              </a:defRPr>
+            </a:lvl8pPr>
+            <a:lvl9pPr marL="2377440" indent="-182880" algn="l" defTabSz="914400" rtl="0" eaLnBrk="1" latinLnBrk="0" hangingPunct="1">
+              <a:spcBef>
+                <a:spcPct val="20000"/>
+              </a:spcBef>
+              <a:buClr>
+                <a:schemeClr val="accent5"/>
+              </a:buClr>
+              <a:buFont typeface="Wingdings" pitchFamily="2" charset="2"/>
+              <a:buChar char="§"/>
+              <a:defRPr sz="1200" kern="1200">
+                <a:solidFill>
+                  <a:schemeClr val="tx2"/>
+                </a:solidFill>
+                <a:latin typeface="+mn-lt"/>
+                <a:ea typeface="+mn-ea"/>
+                <a:cs typeface="+mn-cs"/>
+              </a:defRPr>
+            </a:lvl9pPr>
+          </a:lstStyle>
+          <a:p>
+            <a:pPr marL="45720" indent="0">
+              <a:buNone/>
+            </a:pPr>
+            <a:r>
+              <a:rPr lang="en-US" sz="1800" dirty="0" smtClean="0"/>
+              <a:t>fact </a:t>
+            </a:r>
+            <a:r>
+              <a:rPr lang="en-US" sz="1800" dirty="0"/>
+              <a:t>Task {</a:t>
+            </a:r>
+          </a:p>
+          <a:p>
+            <a:pPr marL="45720" indent="0">
+              <a:buNone/>
+            </a:pPr>
+            <a:r>
+              <a:rPr lang="en-US" sz="1800" dirty="0"/>
+              <a:t>key:</a:t>
+            </a:r>
+          </a:p>
+          <a:p>
+            <a:pPr marL="45720" indent="0">
+              <a:buNone/>
+            </a:pPr>
+            <a:r>
+              <a:rPr lang="en-US" sz="1800" dirty="0" smtClean="0"/>
+              <a:t>    </a:t>
+            </a:r>
+            <a:r>
+              <a:rPr lang="en-US" sz="1800" dirty="0"/>
+              <a:t>unique;</a:t>
+            </a:r>
+          </a:p>
+          <a:p>
+            <a:pPr marL="45720" indent="0">
+              <a:buNone/>
+            </a:pPr>
+            <a:r>
+              <a:rPr lang="en-US" sz="1800" dirty="0"/>
+              <a:t>    </a:t>
+            </a:r>
+            <a:r>
+              <a:rPr lang="en-US" sz="1800" dirty="0">
+                <a:solidFill>
+                  <a:schemeClr val="accent3"/>
+                </a:solidFill>
+              </a:rPr>
+              <a:t>publish</a:t>
+            </a:r>
+            <a:r>
+              <a:rPr lang="en-US" sz="1800" dirty="0"/>
+              <a:t> List </a:t>
+            </a:r>
+            <a:r>
+              <a:rPr lang="en-US" sz="1800" dirty="0" err="1"/>
+              <a:t>list</a:t>
+            </a:r>
+            <a:endParaRPr lang="en-US" sz="1800" dirty="0"/>
+          </a:p>
+          <a:p>
+            <a:pPr marL="45720" indent="0">
+              <a:buNone/>
+            </a:pPr>
+            <a:r>
+              <a:rPr lang="en-US" sz="1800" dirty="0"/>
+              <a:t>        where not </a:t>
+            </a:r>
+            <a:r>
+              <a:rPr lang="en-US" sz="1800" dirty="0" err="1"/>
+              <a:t>this.isComplete</a:t>
+            </a:r>
+            <a:r>
+              <a:rPr lang="en-US" sz="1800" dirty="0"/>
+              <a:t>;</a:t>
+            </a:r>
+          </a:p>
+          <a:p>
+            <a:pPr marL="45720" indent="0">
+              <a:buNone/>
+            </a:pPr>
+            <a:r>
+              <a:rPr lang="en-US" sz="1800" dirty="0"/>
+              <a:t>    time created</a:t>
+            </a:r>
+            <a:r>
+              <a:rPr lang="en-US" sz="1800" dirty="0" smtClean="0"/>
+              <a:t>;</a:t>
+            </a:r>
+          </a:p>
+          <a:p>
+            <a:pPr marL="45720" indent="0">
+              <a:buNone/>
+            </a:pPr>
+            <a:r>
+              <a:rPr lang="en-US" sz="1800" dirty="0" smtClean="0"/>
+              <a:t>}</a:t>
+            </a:r>
+            <a:endParaRPr lang="en-US" sz="1800" dirty="0"/>
+          </a:p>
+        </p:txBody>
+      </p:sp>
     </p:spTree>
     <p:extLst>
       <p:ext uri="{BB962C8B-B14F-4D97-AF65-F5344CB8AC3E}">
-        <p14:creationId xmlns:p14="http://schemas.microsoft.com/office/powerpoint/2010/main" val="1160344878"/>
+        <p14:creationId xmlns:p14="http://schemas.microsoft.com/office/powerpoint/2010/main" val="598223924"/>
       </p:ext>
     </p:extLst>
   </p:cSld>
   <p:clrMapOvr>
     <a:masterClrMapping/>
   </p:clrMapOvr>
-  <mc:AlternateContent xmlns:mc="http://schemas.openxmlformats.org/markup-compatibility/2006">
-    <mc:Choice xmlns:p14="http://schemas.microsoft.com/office/powerpoint/2010/main" Requires="p14">
+  <mc:AlternateContent xmlns:mc="http://schemas.openxmlformats.org/markup-compatibility/2006" xmlns:p14="http://schemas.microsoft.com/office/powerpoint/2010/main">
+    <mc:Choice Requires="p14">
       <p:transition spd="slow" p14:dur="2000"/>
     </mc:Choice>
-    <mc:Fallback>
+    <mc:Fallback xmlns="">
       <p:transition spd="slow"/>
     </mc:Fallback>
   </mc:AlternateContent>
@@ -6207,18 +6388,18 @@
     </p:spTree>
     <p:extLst>
       <p:ext uri="{BB962C8B-B14F-4D97-AF65-F5344CB8AC3E}">
-        <p14:creationId xmlns:p14="http://schemas.microsoft.com/office/powerpoint/2010/main" val="598223924"/>
+        <p14:creationId xmlns:p14="http://schemas.microsoft.com/office/powerpoint/2010/main" val="1119232956"/>
       </p:ext>
     </p:extLst>
   </p:cSld>
   <p:clrMapOvr>
     <a:masterClrMapping/>
   </p:clrMapOvr>
-  <mc:AlternateContent xmlns:mc="http://schemas.openxmlformats.org/markup-compatibility/2006">
-    <mc:Choice xmlns:p14="http://schemas.microsoft.com/office/powerpoint/2010/main" Requires="p14">
+  <mc:AlternateContent xmlns:mc="http://schemas.openxmlformats.org/markup-compatibility/2006" xmlns:p14="http://schemas.microsoft.com/office/powerpoint/2010/main">
+    <mc:Choice Requires="p14">
       <p:transition spd="slow" p14:dur="2000"/>
     </mc:Choice>
-    <mc:Fallback>
+    <mc:Fallback xmlns="">
       <p:transition spd="slow"/>
     </mc:Fallback>
   </mc:AlternateContent>
@@ -6319,11 +6500,11 @@
   <p:clrMapOvr>
     <a:masterClrMapping/>
   </p:clrMapOvr>
-  <mc:AlternateContent xmlns:mc="http://schemas.openxmlformats.org/markup-compatibility/2006">
-    <mc:Choice xmlns:p14="http://schemas.microsoft.com/office/powerpoint/2010/main" Requires="p14">
+  <mc:AlternateContent xmlns:mc="http://schemas.openxmlformats.org/markup-compatibility/2006" xmlns:p14="http://schemas.microsoft.com/office/powerpoint/2010/main">
+    <mc:Choice Requires="p14">
       <p:transition spd="slow" p14:dur="2000"/>
     </mc:Choice>
-    <mc:Fallback>
+    <mc:Fallback xmlns="">
       <p:transition spd="slow"/>
     </mc:Fallback>
   </mc:AlternateContent>
@@ -8212,11 +8393,11 @@
   <p:clrMapOvr>
     <a:masterClrMapping/>
   </p:clrMapOvr>
-  <mc:AlternateContent xmlns:mc="http://schemas.openxmlformats.org/markup-compatibility/2006">
-    <mc:Choice xmlns:p14="http://schemas.microsoft.com/office/powerpoint/2010/main" Requires="p14">
+  <mc:AlternateContent xmlns:mc="http://schemas.openxmlformats.org/markup-compatibility/2006" xmlns:p14="http://schemas.microsoft.com/office/powerpoint/2010/main">
+    <mc:Choice Requires="p14">
       <p:transition spd="slow" p14:dur="2000"/>
     </mc:Choice>
-    <mc:Fallback>
+    <mc:Fallback xmlns="">
       <p:transition spd="slow"/>
     </mc:Fallback>
   </mc:AlternateContent>
@@ -8461,11 +8642,11 @@
   <p:clrMapOvr>
     <a:masterClrMapping/>
   </p:clrMapOvr>
-  <mc:AlternateContent xmlns:mc="http://schemas.openxmlformats.org/markup-compatibility/2006">
-    <mc:Choice xmlns:p14="http://schemas.microsoft.com/office/powerpoint/2010/main" Requires="p14">
+  <mc:AlternateContent xmlns:mc="http://schemas.openxmlformats.org/markup-compatibility/2006" xmlns:p14="http://schemas.microsoft.com/office/powerpoint/2010/main">
+    <mc:Choice Requires="p14">
       <p:transition spd="slow" p14:dur="2000"/>
     </mc:Choice>
-    <mc:Fallback>
+    <mc:Fallback xmlns="">
       <p:transition spd="slow"/>
     </mc:Fallback>
   </mc:AlternateContent>
@@ -8883,11 +9064,11 @@
   <p:clrMapOvr>
     <a:masterClrMapping/>
   </p:clrMapOvr>
-  <mc:AlternateContent xmlns:mc="http://schemas.openxmlformats.org/markup-compatibility/2006">
-    <mc:Choice xmlns:p14="http://schemas.microsoft.com/office/powerpoint/2010/main" Requires="p14">
+  <mc:AlternateContent xmlns:mc="http://schemas.openxmlformats.org/markup-compatibility/2006" xmlns:p14="http://schemas.microsoft.com/office/powerpoint/2010/main">
+    <mc:Choice Requires="p14">
       <p:transition spd="slow" p14:dur="2000"/>
     </mc:Choice>
-    <mc:Fallback>
+    <mc:Fallback xmlns="">
       <p:transition spd="slow"/>
     </mc:Fallback>
   </mc:AlternateContent>
@@ -8986,11 +9167,11 @@
   <p:clrMapOvr>
     <a:masterClrMapping/>
   </p:clrMapOvr>
-  <mc:AlternateContent xmlns:mc="http://schemas.openxmlformats.org/markup-compatibility/2006">
-    <mc:Choice xmlns:p14="http://schemas.microsoft.com/office/powerpoint/2010/main" Requires="p14">
+  <mc:AlternateContent xmlns:mc="http://schemas.openxmlformats.org/markup-compatibility/2006" xmlns:p14="http://schemas.microsoft.com/office/powerpoint/2010/main">
+    <mc:Choice Requires="p14">
       <p:transition spd="slow" p14:dur="2000"/>
     </mc:Choice>
-    <mc:Fallback>
+    <mc:Fallback xmlns="">
       <p:transition spd="slow"/>
     </mc:Fallback>
   </mc:AlternateContent>
@@ -10159,11 +10340,11 @@
   <p:clrMapOvr>
     <a:masterClrMapping/>
   </p:clrMapOvr>
-  <mc:AlternateContent xmlns:mc="http://schemas.openxmlformats.org/markup-compatibility/2006">
-    <mc:Choice xmlns:p14="http://schemas.microsoft.com/office/powerpoint/2010/main" Requires="p14">
+  <mc:AlternateContent xmlns:mc="http://schemas.openxmlformats.org/markup-compatibility/2006" xmlns:p14="http://schemas.microsoft.com/office/powerpoint/2010/main">
+    <mc:Choice Requires="p14">
       <p:transition spd="slow" p14:dur="2000"/>
     </mc:Choice>
-    <mc:Fallback>
+    <mc:Fallback xmlns="">
       <p:transition spd="slow"/>
     </mc:Fallback>
   </mc:AlternateContent>

</xml_diff>

<commit_message>
Added motion to distributed animation.
</commit_message>
<xml_diff>
--- a/Collaborative Android Apps.pptx
+++ b/Collaborative Android Apps.pptx
@@ -12702,6 +12702,28 @@
                                   </p:childTnLst>
                                 </p:cTn>
                               </p:par>
+                              <p:par>
+                                <p:cTn id="11" presetID="42" presetClass="path" presetSubtype="0" accel="50000" decel="50000" fill="hold" grpId="1" nodeType="withEffect">
+                                  <p:stCondLst>
+                                    <p:cond delay="0"/>
+                                  </p:stCondLst>
+                                  <p:childTnLst>
+                                    <p:animMotion origin="layout" path="M 1.38889E-6 -3.98844E-6 L 0.10712 0.0037 " pathEditMode="relative" rAng="0" ptsTypes="AA">
+                                      <p:cBhvr>
+                                        <p:cTn id="12" dur="500" spd="-100000" fill="hold"/>
+                                        <p:tgtEl>
+                                          <p:spTgt spid="39"/>
+                                        </p:tgtEl>
+                                        <p:attrNameLst>
+                                          <p:attrName>ppt_x</p:attrName>
+                                          <p:attrName>ppt_y</p:attrName>
+                                        </p:attrNameLst>
+                                      </p:cBhvr>
+                                      <p:rCtr x="5347" y="185"/>
+                                    </p:animMotion>
+                                  </p:childTnLst>
+                                </p:cTn>
+                              </p:par>
                             </p:childTnLst>
                           </p:cTn>
                         </p:par>
@@ -12709,26 +12731,26 @@
                     </p:cTn>
                   </p:par>
                   <p:par>
-                    <p:cTn id="11" fill="hold">
+                    <p:cTn id="13" fill="hold">
                       <p:stCondLst>
                         <p:cond delay="indefinite"/>
                       </p:stCondLst>
                       <p:childTnLst>
                         <p:par>
-                          <p:cTn id="12" fill="hold">
+                          <p:cTn id="14" fill="hold">
                             <p:stCondLst>
                               <p:cond delay="0"/>
                             </p:stCondLst>
                             <p:childTnLst>
                               <p:par>
-                                <p:cTn id="13" presetID="10" presetClass="entr" presetSubtype="0" fill="hold" nodeType="clickEffect">
+                                <p:cTn id="15" presetID="10" presetClass="entr" presetSubtype="0" fill="hold" nodeType="clickEffect">
                                   <p:stCondLst>
                                     <p:cond delay="0"/>
                                   </p:stCondLst>
                                   <p:childTnLst>
                                     <p:set>
                                       <p:cBhvr>
-                                        <p:cTn id="14" dur="1" fill="hold">
+                                        <p:cTn id="16" dur="1" fill="hold">
                                           <p:stCondLst>
                                             <p:cond delay="0"/>
                                           </p:stCondLst>
@@ -12746,7 +12768,7 @@
                                     </p:set>
                                     <p:animEffect transition="in" filter="fade">
                                       <p:cBhvr>
-                                        <p:cTn id="15" dur="500"/>
+                                        <p:cTn id="17" dur="500"/>
                                         <p:tgtEl>
                                           <p:spTgt spid="31"/>
                                         </p:tgtEl>
@@ -12756,14 +12778,14 @@
                                 </p:cTn>
                               </p:par>
                               <p:par>
-                                <p:cTn id="16" presetID="10" presetClass="entr" presetSubtype="0" fill="hold" grpId="0" nodeType="withEffect">
+                                <p:cTn id="18" presetID="10" presetClass="entr" presetSubtype="0" fill="hold" grpId="0" nodeType="withEffect">
                                   <p:stCondLst>
                                     <p:cond delay="0"/>
                                   </p:stCondLst>
                                   <p:childTnLst>
                                     <p:set>
                                       <p:cBhvr>
-                                        <p:cTn id="17" dur="1" fill="hold">
+                                        <p:cTn id="19" dur="1" fill="hold">
                                           <p:stCondLst>
                                             <p:cond delay="0"/>
                                           </p:stCondLst>
@@ -12781,7 +12803,7 @@
                                     </p:set>
                                     <p:animEffect transition="in" filter="fade">
                                       <p:cBhvr>
-                                        <p:cTn id="18" dur="500"/>
+                                        <p:cTn id="20" dur="500"/>
                                         <p:tgtEl>
                                           <p:spTgt spid="26"/>
                                         </p:tgtEl>
@@ -12791,14 +12813,36 @@
                                 </p:cTn>
                               </p:par>
                               <p:par>
-                                <p:cTn id="19" presetID="10" presetClass="entr" presetSubtype="0" fill="hold" nodeType="withEffect">
+                                <p:cTn id="21" presetID="42" presetClass="path" presetSubtype="0" accel="50000" decel="50000" fill="hold" grpId="1" nodeType="withEffect">
+                                  <p:stCondLst>
+                                    <p:cond delay="0"/>
+                                  </p:stCondLst>
+                                  <p:childTnLst>
+                                    <p:animMotion origin="layout" path="M -4.44444E-6 -4.67731E-6 L -0.08402 0.06038 " pathEditMode="relative" rAng="0" ptsTypes="AA">
+                                      <p:cBhvr>
+                                        <p:cTn id="22" dur="500" spd="-100000" fill="hold"/>
+                                        <p:tgtEl>
+                                          <p:spTgt spid="26"/>
+                                        </p:tgtEl>
+                                        <p:attrNameLst>
+                                          <p:attrName>ppt_x</p:attrName>
+                                          <p:attrName>ppt_y</p:attrName>
+                                        </p:attrNameLst>
+                                      </p:cBhvr>
+                                      <p:rCtr x="-4201" y="3007"/>
+                                    </p:animMotion>
+                                  </p:childTnLst>
+                                </p:cTn>
+                              </p:par>
+                              <p:par>
+                                <p:cTn id="23" presetID="10" presetClass="entr" presetSubtype="0" fill="hold" nodeType="withEffect">
                                   <p:stCondLst>
                                     <p:cond delay="0"/>
                                   </p:stCondLst>
                                   <p:childTnLst>
                                     <p:set>
                                       <p:cBhvr>
-                                        <p:cTn id="20" dur="1" fill="hold">
+                                        <p:cTn id="24" dur="1" fill="hold">
                                           <p:stCondLst>
                                             <p:cond delay="0"/>
                                           </p:stCondLst>
@@ -12816,7 +12860,7 @@
                                     </p:set>
                                     <p:animEffect transition="in" filter="fade">
                                       <p:cBhvr>
-                                        <p:cTn id="21" dur="500"/>
+                                        <p:cTn id="25" dur="500"/>
                                         <p:tgtEl>
                                           <p:spTgt spid="12"/>
                                         </p:tgtEl>
@@ -12826,14 +12870,14 @@
                                 </p:cTn>
                               </p:par>
                               <p:par>
-                                <p:cTn id="22" presetID="10" presetClass="entr" presetSubtype="0" fill="hold" grpId="0" nodeType="withEffect">
+                                <p:cTn id="26" presetID="10" presetClass="entr" presetSubtype="0" fill="hold" grpId="0" nodeType="withEffect">
                                   <p:stCondLst>
                                     <p:cond delay="0"/>
                                   </p:stCondLst>
                                   <p:childTnLst>
                                     <p:set>
                                       <p:cBhvr>
-                                        <p:cTn id="23" dur="1" fill="hold">
+                                        <p:cTn id="27" dur="1" fill="hold">
                                           <p:stCondLst>
                                             <p:cond delay="0"/>
                                           </p:stCondLst>
@@ -12851,12 +12895,34 @@
                                     </p:set>
                                     <p:animEffect transition="in" filter="fade">
                                       <p:cBhvr>
-                                        <p:cTn id="24" dur="500"/>
+                                        <p:cTn id="28" dur="500"/>
                                         <p:tgtEl>
                                           <p:spTgt spid="7"/>
                                         </p:tgtEl>
                                       </p:cBhvr>
                                     </p:animEffect>
+                                  </p:childTnLst>
+                                </p:cTn>
+                              </p:par>
+                              <p:par>
+                                <p:cTn id="29" presetID="42" presetClass="path" presetSubtype="0" accel="50000" decel="50000" fill="hold" grpId="1" nodeType="withEffect">
+                                  <p:stCondLst>
+                                    <p:cond delay="0"/>
+                                  </p:stCondLst>
+                                  <p:childTnLst>
+                                    <p:animMotion origin="layout" path="M 2.5E-6 -1.65626E-6 L 0.07448 0.07726 " pathEditMode="relative" rAng="0" ptsTypes="AA">
+                                      <p:cBhvr>
+                                        <p:cTn id="30" dur="500" spd="-100000" fill="hold"/>
+                                        <p:tgtEl>
+                                          <p:spTgt spid="7"/>
+                                        </p:tgtEl>
+                                        <p:attrNameLst>
+                                          <p:attrName>ppt_x</p:attrName>
+                                          <p:attrName>ppt_y</p:attrName>
+                                        </p:attrNameLst>
+                                      </p:cBhvr>
+                                      <p:rCtr x="3715" y="3863"/>
+                                    </p:animMotion>
                                   </p:childTnLst>
                                 </p:cTn>
                               </p:par>
@@ -12867,26 +12933,26 @@
                     </p:cTn>
                   </p:par>
                   <p:par>
-                    <p:cTn id="25" fill="hold">
+                    <p:cTn id="31" fill="hold">
                       <p:stCondLst>
                         <p:cond delay="indefinite"/>
                       </p:stCondLst>
                       <p:childTnLst>
                         <p:par>
-                          <p:cTn id="26" fill="hold">
+                          <p:cTn id="32" fill="hold">
                             <p:stCondLst>
                               <p:cond delay="0"/>
                             </p:stCondLst>
                             <p:childTnLst>
                               <p:par>
-                                <p:cTn id="27" presetID="10" presetClass="entr" presetSubtype="0" fill="hold" nodeType="clickEffect">
+                                <p:cTn id="33" presetID="10" presetClass="entr" presetSubtype="0" fill="hold" nodeType="clickEffect">
                                   <p:stCondLst>
                                     <p:cond delay="0"/>
                                   </p:stCondLst>
                                   <p:childTnLst>
                                     <p:set>
                                       <p:cBhvr>
-                                        <p:cTn id="28" dur="1" fill="hold">
+                                        <p:cTn id="34" dur="1" fill="hold">
                                           <p:stCondLst>
                                             <p:cond delay="0"/>
                                           </p:stCondLst>
@@ -12904,7 +12970,7 @@
                                     </p:set>
                                     <p:animEffect transition="in" filter="fade">
                                       <p:cBhvr>
-                                        <p:cTn id="29" dur="500"/>
+                                        <p:cTn id="35" dur="500"/>
                                         <p:tgtEl>
                                           <p:spTgt spid="32"/>
                                         </p:tgtEl>
@@ -12914,14 +12980,14 @@
                                 </p:cTn>
                               </p:par>
                               <p:par>
-                                <p:cTn id="30" presetID="10" presetClass="entr" presetSubtype="0" fill="hold" grpId="0" nodeType="withEffect">
+                                <p:cTn id="36" presetID="10" presetClass="entr" presetSubtype="0" fill="hold" grpId="0" nodeType="withEffect">
                                   <p:stCondLst>
                                     <p:cond delay="0"/>
                                   </p:stCondLst>
                                   <p:childTnLst>
                                     <p:set>
                                       <p:cBhvr>
-                                        <p:cTn id="31" dur="1" fill="hold">
+                                        <p:cTn id="37" dur="1" fill="hold">
                                           <p:stCondLst>
                                             <p:cond delay="0"/>
                                           </p:stCondLst>
@@ -12939,12 +13005,34 @@
                                     </p:set>
                                     <p:animEffect transition="in" filter="fade">
                                       <p:cBhvr>
-                                        <p:cTn id="32" dur="500"/>
+                                        <p:cTn id="38" dur="500"/>
                                         <p:tgtEl>
                                           <p:spTgt spid="27"/>
                                         </p:tgtEl>
                                       </p:cBhvr>
                                     </p:animEffect>
+                                  </p:childTnLst>
+                                </p:cTn>
+                              </p:par>
+                              <p:par>
+                                <p:cTn id="39" presetID="42" presetClass="path" presetSubtype="0" accel="50000" decel="50000" fill="hold" grpId="1" nodeType="withEffect">
+                                  <p:stCondLst>
+                                    <p:cond delay="0"/>
+                                  </p:stCondLst>
+                                  <p:childTnLst>
+                                    <p:animMotion origin="layout" path="M 1.38889E-6 -3.18297E-6 L 0.09462 -0.01295 " pathEditMode="relative" rAng="0" ptsTypes="AA">
+                                      <p:cBhvr>
+                                        <p:cTn id="40" dur="500" spd="-100000" fill="hold"/>
+                                        <p:tgtEl>
+                                          <p:spTgt spid="27"/>
+                                        </p:tgtEl>
+                                        <p:attrNameLst>
+                                          <p:attrName>ppt_x</p:attrName>
+                                          <p:attrName>ppt_y</p:attrName>
+                                        </p:attrNameLst>
+                                      </p:cBhvr>
+                                      <p:rCtr x="4722" y="-648"/>
+                                    </p:animMotion>
                                   </p:childTnLst>
                                 </p:cTn>
                               </p:par>
@@ -12955,26 +13043,26 @@
                     </p:cTn>
                   </p:par>
                   <p:par>
-                    <p:cTn id="33" fill="hold">
+                    <p:cTn id="41" fill="hold">
                       <p:stCondLst>
                         <p:cond delay="indefinite"/>
                       </p:stCondLst>
                       <p:childTnLst>
                         <p:par>
-                          <p:cTn id="34" fill="hold">
+                          <p:cTn id="42" fill="hold">
                             <p:stCondLst>
                               <p:cond delay="0"/>
                             </p:stCondLst>
                             <p:childTnLst>
                               <p:par>
-                                <p:cTn id="35" presetID="10" presetClass="entr" presetSubtype="0" fill="hold" nodeType="clickEffect">
+                                <p:cTn id="43" presetID="10" presetClass="entr" presetSubtype="0" fill="hold" nodeType="clickEffect">
                                   <p:stCondLst>
                                     <p:cond delay="0"/>
                                   </p:stCondLst>
                                   <p:childTnLst>
                                     <p:set>
                                       <p:cBhvr>
-                                        <p:cTn id="36" dur="1" fill="hold">
+                                        <p:cTn id="44" dur="1" fill="hold">
                                           <p:stCondLst>
                                             <p:cond delay="0"/>
                                           </p:stCondLst>
@@ -12992,7 +13080,7 @@
                                     </p:set>
                                     <p:animEffect transition="in" filter="fade">
                                       <p:cBhvr>
-                                        <p:cTn id="37" dur="500"/>
+                                        <p:cTn id="45" dur="500"/>
                                         <p:tgtEl>
                                           <p:spTgt spid="45"/>
                                         </p:tgtEl>
@@ -13002,14 +13090,14 @@
                                 </p:cTn>
                               </p:par>
                               <p:par>
-                                <p:cTn id="38" presetID="10" presetClass="entr" presetSubtype="0" fill="hold" grpId="0" nodeType="withEffect">
+                                <p:cTn id="46" presetID="10" presetClass="entr" presetSubtype="0" fill="hold" grpId="0" nodeType="withEffect">
                                   <p:stCondLst>
                                     <p:cond delay="0"/>
                                   </p:stCondLst>
                                   <p:childTnLst>
                                     <p:set>
                                       <p:cBhvr>
-                                        <p:cTn id="39" dur="1" fill="hold">
+                                        <p:cTn id="47" dur="1" fill="hold">
                                           <p:stCondLst>
                                             <p:cond delay="0"/>
                                           </p:stCondLst>
@@ -13027,7 +13115,7 @@
                                     </p:set>
                                     <p:animEffect transition="in" filter="fade">
                                       <p:cBhvr>
-                                        <p:cTn id="40" dur="500"/>
+                                        <p:cTn id="48" dur="500"/>
                                         <p:tgtEl>
                                           <p:spTgt spid="40"/>
                                         </p:tgtEl>
@@ -13037,14 +13125,36 @@
                                 </p:cTn>
                               </p:par>
                               <p:par>
-                                <p:cTn id="41" presetID="10" presetClass="entr" presetSubtype="0" fill="hold" nodeType="withEffect">
+                                <p:cTn id="49" presetID="42" presetClass="path" presetSubtype="0" accel="50000" decel="50000" fill="hold" grpId="1" nodeType="withEffect">
+                                  <p:stCondLst>
+                                    <p:cond delay="0"/>
+                                  </p:stCondLst>
+                                  <p:childTnLst>
+                                    <p:animMotion origin="layout" path="M 3.61111E-6 -3.7037E-6 L -0.01441 -0.13634 " pathEditMode="relative" rAng="0" ptsTypes="AA">
+                                      <p:cBhvr>
+                                        <p:cTn id="50" dur="500" spd="-100000" fill="hold"/>
+                                        <p:tgtEl>
+                                          <p:spTgt spid="40"/>
+                                        </p:tgtEl>
+                                        <p:attrNameLst>
+                                          <p:attrName>ppt_x</p:attrName>
+                                          <p:attrName>ppt_y</p:attrName>
+                                        </p:attrNameLst>
+                                      </p:cBhvr>
+                                      <p:rCtr x="-729" y="-6829"/>
+                                    </p:animMotion>
+                                  </p:childTnLst>
+                                </p:cTn>
+                              </p:par>
+                              <p:par>
+                                <p:cTn id="51" presetID="10" presetClass="entr" presetSubtype="0" fill="hold" nodeType="withEffect">
                                   <p:stCondLst>
                                     <p:cond delay="0"/>
                                   </p:stCondLst>
                                   <p:childTnLst>
                                     <p:set>
                                       <p:cBhvr>
-                                        <p:cTn id="42" dur="1" fill="hold">
+                                        <p:cTn id="52" dur="1" fill="hold">
                                           <p:stCondLst>
                                             <p:cond delay="0"/>
                                           </p:stCondLst>
@@ -13062,7 +13172,7 @@
                                     </p:set>
                                     <p:animEffect transition="in" filter="fade">
                                       <p:cBhvr>
-                                        <p:cTn id="43" dur="500"/>
+                                        <p:cTn id="53" dur="500"/>
                                         <p:tgtEl>
                                           <p:spTgt spid="13"/>
                                         </p:tgtEl>
@@ -13072,14 +13182,14 @@
                                 </p:cTn>
                               </p:par>
                               <p:par>
-                                <p:cTn id="44" presetID="10" presetClass="entr" presetSubtype="0" fill="hold" grpId="0" nodeType="withEffect">
+                                <p:cTn id="54" presetID="10" presetClass="entr" presetSubtype="0" fill="hold" grpId="0" nodeType="withEffect">
                                   <p:stCondLst>
                                     <p:cond delay="0"/>
                                   </p:stCondLst>
                                   <p:childTnLst>
                                     <p:set>
                                       <p:cBhvr>
-                                        <p:cTn id="45" dur="1" fill="hold">
+                                        <p:cTn id="55" dur="1" fill="hold">
                                           <p:stCondLst>
                                             <p:cond delay="0"/>
                                           </p:stCondLst>
@@ -13097,12 +13207,34 @@
                                     </p:set>
                                     <p:animEffect transition="in" filter="fade">
                                       <p:cBhvr>
-                                        <p:cTn id="46" dur="500"/>
+                                        <p:cTn id="56" dur="500"/>
                                         <p:tgtEl>
                                           <p:spTgt spid="8"/>
                                         </p:tgtEl>
                                       </p:cBhvr>
                                     </p:animEffect>
+                                  </p:childTnLst>
+                                </p:cTn>
+                              </p:par>
+                              <p:par>
+                                <p:cTn id="57" presetID="42" presetClass="path" presetSubtype="0" accel="50000" decel="50000" fill="hold" grpId="1" nodeType="withEffect">
+                                  <p:stCondLst>
+                                    <p:cond delay="0"/>
+                                  </p:stCondLst>
+                                  <p:childTnLst>
+                                    <p:animMotion origin="layout" path="M -1.66667E-6 -1.61925E-7 L 0.08646 0.05945 " pathEditMode="relative" rAng="0" ptsTypes="AA">
+                                      <p:cBhvr>
+                                        <p:cTn id="58" dur="500" spd="-100000" fill="hold"/>
+                                        <p:tgtEl>
+                                          <p:spTgt spid="8"/>
+                                        </p:tgtEl>
+                                        <p:attrNameLst>
+                                          <p:attrName>ppt_x</p:attrName>
+                                          <p:attrName>ppt_y</p:attrName>
+                                        </p:attrNameLst>
+                                      </p:cBhvr>
+                                      <p:rCtr x="4323" y="2961"/>
+                                    </p:animMotion>
                                   </p:childTnLst>
                                 </p:cTn>
                               </p:par>
@@ -13113,26 +13245,26 @@
                     </p:cTn>
                   </p:par>
                   <p:par>
-                    <p:cTn id="47" fill="hold">
+                    <p:cTn id="59" fill="hold">
                       <p:stCondLst>
                         <p:cond delay="indefinite"/>
                       </p:stCondLst>
                       <p:childTnLst>
                         <p:par>
-                          <p:cTn id="48" fill="hold">
+                          <p:cTn id="60" fill="hold">
                             <p:stCondLst>
                               <p:cond delay="0"/>
                             </p:stCondLst>
                             <p:childTnLst>
                               <p:par>
-                                <p:cTn id="49" presetID="10" presetClass="entr" presetSubtype="0" fill="hold" nodeType="clickEffect">
+                                <p:cTn id="61" presetID="10" presetClass="entr" presetSubtype="0" fill="hold" nodeType="clickEffect">
                                   <p:stCondLst>
                                     <p:cond delay="0"/>
                                   </p:stCondLst>
                                   <p:childTnLst>
                                     <p:set>
                                       <p:cBhvr>
-                                        <p:cTn id="50" dur="1" fill="hold">
+                                        <p:cTn id="62" dur="1" fill="hold">
                                           <p:stCondLst>
                                             <p:cond delay="0"/>
                                           </p:stCondLst>
@@ -13150,7 +13282,7 @@
                                     </p:set>
                                     <p:animEffect transition="in" filter="fade">
                                       <p:cBhvr>
-                                        <p:cTn id="51" dur="500"/>
+                                        <p:cTn id="63" dur="500"/>
                                         <p:tgtEl>
                                           <p:spTgt spid="14"/>
                                         </p:tgtEl>
@@ -13160,14 +13292,14 @@
                                 </p:cTn>
                               </p:par>
                               <p:par>
-                                <p:cTn id="52" presetID="10" presetClass="entr" presetSubtype="0" fill="hold" grpId="0" nodeType="withEffect">
+                                <p:cTn id="64" presetID="10" presetClass="entr" presetSubtype="0" fill="hold" grpId="0" nodeType="withEffect">
                                   <p:stCondLst>
                                     <p:cond delay="0"/>
                                   </p:stCondLst>
                                   <p:childTnLst>
                                     <p:set>
                                       <p:cBhvr>
-                                        <p:cTn id="53" dur="1" fill="hold">
+                                        <p:cTn id="65" dur="1" fill="hold">
                                           <p:stCondLst>
                                             <p:cond delay="0"/>
                                           </p:stCondLst>
@@ -13185,12 +13317,34 @@
                                     </p:set>
                                     <p:animEffect transition="in" filter="fade">
                                       <p:cBhvr>
-                                        <p:cTn id="54" dur="500"/>
+                                        <p:cTn id="66" dur="500"/>
                                         <p:tgtEl>
                                           <p:spTgt spid="9"/>
                                         </p:tgtEl>
                                       </p:cBhvr>
                                     </p:animEffect>
+                                  </p:childTnLst>
+                                </p:cTn>
+                              </p:par>
+                              <p:par>
+                                <p:cTn id="67" presetID="42" presetClass="path" presetSubtype="0" accel="50000" decel="50000" fill="hold" grpId="1" nodeType="withEffect">
+                                  <p:stCondLst>
+                                    <p:cond delay="0"/>
+                                  </p:stCondLst>
+                                  <p:childTnLst>
+                                    <p:animMotion origin="layout" path="M -1.66667E-6 -1.61925E-7 L -0.10937 -0.00717 " pathEditMode="relative" rAng="0" ptsTypes="AA">
+                                      <p:cBhvr>
+                                        <p:cTn id="68" dur="500" spd="-100000" fill="hold"/>
+                                        <p:tgtEl>
+                                          <p:spTgt spid="9"/>
+                                        </p:tgtEl>
+                                        <p:attrNameLst>
+                                          <p:attrName>ppt_x</p:attrName>
+                                          <p:attrName>ppt_y</p:attrName>
+                                        </p:attrNameLst>
+                                      </p:cBhvr>
+                                      <p:rCtr x="-5469" y="-370"/>
+                                    </p:animMotion>
                                   </p:childTnLst>
                                 </p:cTn>
                               </p:par>
@@ -13201,26 +13355,26 @@
                     </p:cTn>
                   </p:par>
                   <p:par>
-                    <p:cTn id="55" fill="hold">
+                    <p:cTn id="69" fill="hold">
                       <p:stCondLst>
                         <p:cond delay="indefinite"/>
                       </p:stCondLst>
                       <p:childTnLst>
                         <p:par>
-                          <p:cTn id="56" fill="hold">
+                          <p:cTn id="70" fill="hold">
                             <p:stCondLst>
                               <p:cond delay="0"/>
                             </p:stCondLst>
                             <p:childTnLst>
                               <p:par>
-                                <p:cTn id="57" presetID="10" presetClass="entr" presetSubtype="0" fill="hold" nodeType="clickEffect">
+                                <p:cTn id="71" presetID="10" presetClass="entr" presetSubtype="0" fill="hold" nodeType="clickEffect">
                                   <p:stCondLst>
                                     <p:cond delay="0"/>
                                   </p:stCondLst>
                                   <p:childTnLst>
                                     <p:set>
                                       <p:cBhvr>
-                                        <p:cTn id="58" dur="1" fill="hold">
+                                        <p:cTn id="72" dur="1" fill="hold">
                                           <p:stCondLst>
                                             <p:cond delay="0"/>
                                           </p:stCondLst>
@@ -13238,7 +13392,7 @@
                                     </p:set>
                                     <p:animEffect transition="in" filter="fade">
                                       <p:cBhvr>
-                                        <p:cTn id="59" dur="500"/>
+                                        <p:cTn id="73" dur="500"/>
                                         <p:tgtEl>
                                           <p:spTgt spid="46"/>
                                         </p:tgtEl>
@@ -13248,14 +13402,14 @@
                                 </p:cTn>
                               </p:par>
                               <p:par>
-                                <p:cTn id="60" presetID="10" presetClass="entr" presetSubtype="0" fill="hold" grpId="0" nodeType="withEffect">
+                                <p:cTn id="74" presetID="10" presetClass="entr" presetSubtype="0" fill="hold" grpId="0" nodeType="withEffect">
                                   <p:stCondLst>
                                     <p:cond delay="0"/>
                                   </p:stCondLst>
                                   <p:childTnLst>
                                     <p:set>
                                       <p:cBhvr>
-                                        <p:cTn id="61" dur="1" fill="hold">
+                                        <p:cTn id="75" dur="1" fill="hold">
                                           <p:stCondLst>
                                             <p:cond delay="0"/>
                                           </p:stCondLst>
@@ -13273,7 +13427,7 @@
                                     </p:set>
                                     <p:animEffect transition="in" filter="fade">
                                       <p:cBhvr>
-                                        <p:cTn id="62" dur="500"/>
+                                        <p:cTn id="76" dur="500"/>
                                         <p:tgtEl>
                                           <p:spTgt spid="41"/>
                                         </p:tgtEl>
@@ -13283,14 +13437,36 @@
                                 </p:cTn>
                               </p:par>
                               <p:par>
-                                <p:cTn id="63" presetID="10" presetClass="entr" presetSubtype="0" fill="hold" nodeType="withEffect">
+                                <p:cTn id="77" presetID="42" presetClass="path" presetSubtype="0" accel="50000" decel="50000" fill="hold" grpId="1" nodeType="withEffect">
+                                  <p:stCondLst>
+                                    <p:cond delay="0"/>
+                                  </p:stCondLst>
+                                  <p:childTnLst>
+                                    <p:animMotion origin="layout" path="M -2.77778E-6 -2.22222E-6 L -0.03507 -0.11389 " pathEditMode="relative" rAng="0" ptsTypes="AA">
+                                      <p:cBhvr>
+                                        <p:cTn id="78" dur="500" spd="-100000" fill="hold"/>
+                                        <p:tgtEl>
+                                          <p:spTgt spid="41"/>
+                                        </p:tgtEl>
+                                        <p:attrNameLst>
+                                          <p:attrName>ppt_x</p:attrName>
+                                          <p:attrName>ppt_y</p:attrName>
+                                        </p:attrNameLst>
+                                      </p:cBhvr>
+                                      <p:rCtr x="-1753" y="-5694"/>
+                                    </p:animMotion>
+                                  </p:childTnLst>
+                                </p:cTn>
+                              </p:par>
+                              <p:par>
+                                <p:cTn id="79" presetID="10" presetClass="entr" presetSubtype="0" fill="hold" nodeType="withEffect">
                                   <p:stCondLst>
                                     <p:cond delay="0"/>
                                   </p:stCondLst>
                                   <p:childTnLst>
                                     <p:set>
                                       <p:cBhvr>
-                                        <p:cTn id="64" dur="1" fill="hold">
+                                        <p:cTn id="80" dur="1" fill="hold">
                                           <p:stCondLst>
                                             <p:cond delay="0"/>
                                           </p:stCondLst>
@@ -13308,7 +13484,7 @@
                                     </p:set>
                                     <p:animEffect transition="in" filter="fade">
                                       <p:cBhvr>
-                                        <p:cTn id="65" dur="500"/>
+                                        <p:cTn id="81" dur="500"/>
                                         <p:tgtEl>
                                           <p:spTgt spid="33"/>
                                         </p:tgtEl>
@@ -13318,14 +13494,14 @@
                                 </p:cTn>
                               </p:par>
                               <p:par>
-                                <p:cTn id="66" presetID="10" presetClass="entr" presetSubtype="0" fill="hold" grpId="0" nodeType="withEffect">
+                                <p:cTn id="82" presetID="10" presetClass="entr" presetSubtype="0" fill="hold" grpId="0" nodeType="withEffect">
                                   <p:stCondLst>
                                     <p:cond delay="0"/>
                                   </p:stCondLst>
                                   <p:childTnLst>
                                     <p:set>
                                       <p:cBhvr>
-                                        <p:cTn id="67" dur="1" fill="hold">
+                                        <p:cTn id="83" dur="1" fill="hold">
                                           <p:stCondLst>
                                             <p:cond delay="0"/>
                                           </p:stCondLst>
@@ -13343,12 +13519,34 @@
                                     </p:set>
                                     <p:animEffect transition="in" filter="fade">
                                       <p:cBhvr>
-                                        <p:cTn id="68" dur="500"/>
+                                        <p:cTn id="84" dur="500"/>
                                         <p:tgtEl>
                                           <p:spTgt spid="28"/>
                                         </p:tgtEl>
                                       </p:cBhvr>
                                     </p:animEffect>
+                                  </p:childTnLst>
+                                </p:cTn>
+                              </p:par>
+                              <p:par>
+                                <p:cTn id="85" presetID="42" presetClass="path" presetSubtype="0" accel="50000" decel="50000" fill="hold" grpId="1" nodeType="withEffect">
+                                  <p:stCondLst>
+                                    <p:cond delay="0"/>
+                                  </p:stCondLst>
+                                  <p:childTnLst>
+                                    <p:animMotion origin="layout" path="M 3.33333E-6 -3.33333E-6 L -0.06789 0.03148 " pathEditMode="relative" rAng="0" ptsTypes="AA">
+                                      <p:cBhvr>
+                                        <p:cTn id="86" dur="500" spd="-100000" fill="hold"/>
+                                        <p:tgtEl>
+                                          <p:spTgt spid="28"/>
+                                        </p:tgtEl>
+                                        <p:attrNameLst>
+                                          <p:attrName>ppt_x</p:attrName>
+                                          <p:attrName>ppt_y</p:attrName>
+                                        </p:attrNameLst>
+                                      </p:cBhvr>
+                                      <p:rCtr x="-3403" y="1574"/>
+                                    </p:animMotion>
                                   </p:childTnLst>
                                 </p:cTn>
                               </p:par>
@@ -13381,14 +13579,23 @@
     </p:tnLst>
     <p:bldLst>
       <p:bldP spid="7" grpId="0" animBg="1"/>
+      <p:bldP spid="7" grpId="1" animBg="1"/>
       <p:bldP spid="8" grpId="0" animBg="1"/>
+      <p:bldP spid="8" grpId="1" animBg="1"/>
       <p:bldP spid="9" grpId="0" animBg="1"/>
+      <p:bldP spid="9" grpId="1" animBg="1"/>
       <p:bldP spid="26" grpId="0" animBg="1"/>
+      <p:bldP spid="26" grpId="1" animBg="1"/>
       <p:bldP spid="27" grpId="0" animBg="1"/>
+      <p:bldP spid="27" grpId="1" animBg="1"/>
       <p:bldP spid="28" grpId="0" animBg="1"/>
+      <p:bldP spid="28" grpId="1" animBg="1"/>
       <p:bldP spid="39" grpId="0" animBg="1"/>
+      <p:bldP spid="39" grpId="1" animBg="1"/>
       <p:bldP spid="40" grpId="0" animBg="1"/>
+      <p:bldP spid="40" grpId="1" animBg="1"/>
       <p:bldP spid="41" grpId="0" animBg="1"/>
+      <p:bldP spid="41" grpId="1" animBg="1"/>
     </p:bldLst>
   </p:timing>
 </p:sld>
@@ -13428,11 +13635,7 @@
           <a:p>
             <a:r>
               <a:rPr lang="en-US" dirty="0" smtClean="0"/>
-              <a:t>Facts are not </a:t>
-            </a:r>
-            <a:r>
-              <a:rPr lang="en-US" dirty="0" smtClean="0"/>
-              <a:t>destroyed</a:t>
+              <a:t>Facts are not destroyed</a:t>
             </a:r>
           </a:p>
           <a:p>
@@ -13440,7 +13643,6 @@
               <a:rPr lang="en-US" dirty="0" smtClean="0"/>
               <a:t>Facts are not changed</a:t>
             </a:r>
-            <a:endParaRPr lang="en-US" dirty="0" smtClean="0"/>
           </a:p>
           <a:p>
             <a:r>

</xml_diff>